<commit_message>
Commit notes and ppt
</commit_message>
<xml_diff>
--- a/Angular JS - Workshop.pptx
+++ b/Angular JS - Workshop.pptx
@@ -19,10 +19,9 @@
     <p:sldId id="265" r:id="rId13"/>
     <p:sldId id="266" r:id="rId14"/>
     <p:sldId id="268" r:id="rId15"/>
-    <p:sldId id="273" r:id="rId16"/>
-    <p:sldId id="270" r:id="rId17"/>
-    <p:sldId id="271" r:id="rId18"/>
-    <p:sldId id="272" r:id="rId19"/>
+    <p:sldId id="270" r:id="rId16"/>
+    <p:sldId id="271" r:id="rId17"/>
+    <p:sldId id="272" r:id="rId18"/>
   </p:sldIdLst>
   <p:sldSz cx="12192000" cy="6858000"/>
   <p:notesSz cx="6858000" cy="9144000"/>
@@ -3556,15 +3555,7 @@
                   <a:schemeClr val="tx1"/>
                 </a:solidFill>
               </a:rPr>
-              <a:t> </a:t>
-            </a:r>
-            <a:r>
-              <a:rPr lang="en-US" sz="2400" dirty="0">
-                <a:solidFill>
-                  <a:schemeClr val="tx1"/>
-                </a:solidFill>
-              </a:rPr>
-              <a:t>    </a:t>
+              <a:t>     </a:t>
             </a:r>
             <a:r>
               <a:rPr lang="en-US" sz="2400" dirty="0" err="1">
@@ -4073,21 +4064,8 @@
                   <a:schemeClr val="tx1"/>
                 </a:solidFill>
               </a:rPr>
-              <a:t>The </a:t>
-            </a:r>
-            <a:r>
-              <a:rPr lang="en-US" sz="3800" dirty="0">
-                <a:solidFill>
-                  <a:schemeClr val="tx1"/>
-                </a:solidFill>
-              </a:rPr>
-              <a:t>routing is done in angular JS using the ng route module. </a:t>
-            </a:r>
-            <a:endParaRPr lang="en-US" sz="3800" dirty="0">
-              <a:solidFill>
-                <a:schemeClr val="tx1"/>
-              </a:solidFill>
-            </a:endParaRPr>
+              <a:t>The routing is done in angular JS using the ng route module. </a:t>
+            </a:r>
           </a:p>
           <a:p>
             <a:pPr>
@@ -4110,16 +4088,7 @@
                 </a:solidFill>
                 <a:hlinkClick r:id="rId2"/>
               </a:rPr>
-              <a:t>https://</a:t>
-            </a:r>
-            <a:r>
-              <a:rPr lang="en-US" sz="3800" dirty="0">
-                <a:solidFill>
-                  <a:schemeClr val="tx1"/>
-                </a:solidFill>
-                <a:hlinkClick r:id="rId2"/>
-              </a:rPr>
-              <a:t>code.angularjs.org/1.7.8/angular-route.min.js</a:t>
+              <a:t>https://code.angularjs.org/1.7.8/angular-route.min.js</a:t>
             </a:r>
             <a:r>
               <a:rPr lang="en-US" sz="3800" dirty="0">
@@ -4175,11 +4144,6 @@
               </a:rPr>
               <a:t> dependency to your module. </a:t>
             </a:r>
-            <a:endParaRPr lang="en-US" sz="3800" dirty="0">
-              <a:solidFill>
-                <a:schemeClr val="tx1"/>
-              </a:solidFill>
-            </a:endParaRPr>
           </a:p>
           <a:p>
             <a:pPr marL="0" indent="0">
@@ -4403,7 +4367,7 @@
           <a:p>
             <a:r>
               <a:rPr lang="en-US" dirty="0" smtClean="0"/>
-              <a:t>Deploy App</a:t>
+              <a:t>References</a:t>
             </a:r>
             <a:endParaRPr lang="en-US" dirty="0"/>
           </a:p>
@@ -4421,35 +4385,59 @@
         </p:nvSpPr>
         <p:spPr/>
         <p:txBody>
-          <a:bodyPr/>
-          <a:lstStyle/>
-          <a:p>
-            <a:r>
-              <a:rPr lang="en-US" dirty="0" smtClean="0"/>
-              <a:t>Node </a:t>
-            </a:r>
-            <a:r>
-              <a:rPr lang="en-US" dirty="0" err="1" smtClean="0"/>
-              <a:t>js</a:t>
-            </a:r>
-            <a:r>
-              <a:rPr lang="en-US" smtClean="0"/>
-              <a:t> </a:t>
-            </a:r>
-            <a:endParaRPr lang="en-US"/>
+          <a:bodyPr>
+            <a:normAutofit/>
+          </a:bodyPr>
+          <a:lstStyle/>
+          <a:p>
+            <a:r>
+              <a:rPr lang="en-US" sz="2400" dirty="0">
+                <a:hlinkClick r:id="rId2"/>
+              </a:rPr>
+              <a:t>A Conceptual Introduction to AngularJS</a:t>
+            </a:r>
+            <a:endParaRPr lang="en-US" sz="2400" dirty="0"/>
+          </a:p>
+          <a:p>
+            <a:r>
+              <a:rPr lang="en-US" sz="2400" dirty="0">
+                <a:hlinkClick r:id="rId3"/>
+              </a:rPr>
+              <a:t>https://angular.io</a:t>
+            </a:r>
+            <a:r>
+              <a:rPr lang="en-US" sz="2400" dirty="0" smtClean="0">
+                <a:hlinkClick r:id="rId3"/>
+              </a:rPr>
+              <a:t>/</a:t>
+            </a:r>
+            <a:r>
+              <a:rPr lang="en-US" sz="2400" dirty="0" smtClean="0"/>
+              <a:t>.</a:t>
+            </a:r>
+          </a:p>
+          <a:p>
+            <a:endParaRPr lang="en-US" sz="2400" dirty="0"/>
           </a:p>
         </p:txBody>
       </p:sp>
     </p:spTree>
     <p:extLst>
       <p:ext uri="{BB962C8B-B14F-4D97-AF65-F5344CB8AC3E}">
-        <p14:creationId xmlns:p14="http://schemas.microsoft.com/office/powerpoint/2010/main" val="2877315175"/>
+        <p14:creationId xmlns:p14="http://schemas.microsoft.com/office/powerpoint/2010/main" val="2640555480"/>
       </p:ext>
     </p:extLst>
   </p:cSld>
   <p:clrMapOvr>
     <a:masterClrMapping/>
   </p:clrMapOvr>
+  <p:timing>
+    <p:tnLst>
+      <p:par>
+        <p:cTn id="1" dur="indefinite" restart="never" nodeType="tmRoot"/>
+      </p:par>
+    </p:tnLst>
+  </p:timing>
 </p:sld>
 </file>
 
@@ -4477,7 +4465,7 @@
             <a:spLocks noGrp="1"/>
           </p:cNvSpPr>
           <p:nvPr>
-            <p:ph type="title"/>
+            <p:ph type="ctrTitle"/>
           </p:nvPr>
         </p:nvSpPr>
         <p:spPr/>
@@ -4487,70 +4475,48 @@
           <a:p>
             <a:r>
               <a:rPr lang="en-US" dirty="0" smtClean="0"/>
-              <a:t>References</a:t>
-            </a:r>
-            <a:endParaRPr lang="en-US" dirty="0"/>
-          </a:p>
-        </p:txBody>
-      </p:sp>
-      <p:sp>
-        <p:nvSpPr>
-          <p:cNvPr id="3" name="Content Placeholder 2"/>
-          <p:cNvSpPr>
-            <a:spLocks noGrp="1"/>
-          </p:cNvSpPr>
-          <p:nvPr>
-            <p:ph idx="1"/>
+              <a:t>Any Questions?</a:t>
+            </a:r>
+            <a:endParaRPr lang="en-US" dirty="0"/>
+          </a:p>
+        </p:txBody>
+      </p:sp>
+      <p:sp>
+        <p:nvSpPr>
+          <p:cNvPr id="3" name="Subtitle 2"/>
+          <p:cNvSpPr>
+            <a:spLocks noGrp="1"/>
+          </p:cNvSpPr>
+          <p:nvPr>
+            <p:ph type="subTitle" idx="1"/>
           </p:nvPr>
         </p:nvSpPr>
         <p:spPr/>
         <p:txBody>
-          <a:bodyPr>
-            <a:normAutofit/>
-          </a:bodyPr>
-          <a:lstStyle/>
-          <a:p>
-            <a:r>
-              <a:rPr lang="en-US" sz="2400" dirty="0">
-                <a:hlinkClick r:id="rId2"/>
-              </a:rPr>
-              <a:t>A Conceptual Introduction to AngularJS</a:t>
-            </a:r>
-            <a:endParaRPr lang="en-US" sz="2400" dirty="0"/>
-          </a:p>
-          <a:p>
-            <a:r>
-              <a:rPr lang="en-US" sz="2400" dirty="0">
-                <a:hlinkClick r:id="rId3"/>
-              </a:rPr>
-              <a:t>https://angular.io</a:t>
-            </a:r>
-            <a:r>
-              <a:rPr lang="en-US" sz="2400" dirty="0" smtClean="0">
-                <a:hlinkClick r:id="rId3"/>
-              </a:rPr>
-              <a:t>/</a:t>
-            </a:r>
-            <a:r>
-              <a:rPr lang="en-US" sz="2400" dirty="0" smtClean="0"/>
-              <a:t>.</a:t>
-            </a:r>
-          </a:p>
-          <a:p>
-            <a:endParaRPr lang="en-US" sz="2400" dirty="0"/>
+          <a:bodyPr/>
+          <a:lstStyle/>
+          <a:p>
+            <a:endParaRPr lang="en-US"/>
           </a:p>
         </p:txBody>
       </p:sp>
     </p:spTree>
     <p:extLst>
       <p:ext uri="{BB962C8B-B14F-4D97-AF65-F5344CB8AC3E}">
-        <p14:creationId xmlns:p14="http://schemas.microsoft.com/office/powerpoint/2010/main" val="2640555480"/>
+        <p14:creationId xmlns:p14="http://schemas.microsoft.com/office/powerpoint/2010/main" val="2403441843"/>
       </p:ext>
     </p:extLst>
   </p:cSld>
   <p:clrMapOvr>
     <a:masterClrMapping/>
   </p:clrMapOvr>
+  <p:timing>
+    <p:tnLst>
+      <p:par>
+        <p:cTn id="1" dur="indefinite" restart="never" nodeType="tmRoot"/>
+      </p:par>
+    </p:tnLst>
+  </p:timing>
 </p:sld>
 </file>
 
@@ -4588,78 +4554,6 @@
           <a:p>
             <a:r>
               <a:rPr lang="en-US" dirty="0" smtClean="0"/>
-              <a:t>Any Questions?</a:t>
-            </a:r>
-            <a:endParaRPr lang="en-US" dirty="0"/>
-          </a:p>
-        </p:txBody>
-      </p:sp>
-      <p:sp>
-        <p:nvSpPr>
-          <p:cNvPr id="3" name="Subtitle 2"/>
-          <p:cNvSpPr>
-            <a:spLocks noGrp="1"/>
-          </p:cNvSpPr>
-          <p:nvPr>
-            <p:ph type="subTitle" idx="1"/>
-          </p:nvPr>
-        </p:nvSpPr>
-        <p:spPr/>
-        <p:txBody>
-          <a:bodyPr/>
-          <a:lstStyle/>
-          <a:p>
-            <a:endParaRPr lang="en-US"/>
-          </a:p>
-        </p:txBody>
-      </p:sp>
-    </p:spTree>
-    <p:extLst>
-      <p:ext uri="{BB962C8B-B14F-4D97-AF65-F5344CB8AC3E}">
-        <p14:creationId xmlns:p14="http://schemas.microsoft.com/office/powerpoint/2010/main" val="2403441843"/>
-      </p:ext>
-    </p:extLst>
-  </p:cSld>
-  <p:clrMapOvr>
-    <a:masterClrMapping/>
-  </p:clrMapOvr>
-</p:sld>
-</file>
-
-<file path=ppt/slides/slide18.xml><?xml version="1.0" encoding="utf-8"?>
-<p:sld xmlns:a="http://schemas.openxmlformats.org/drawingml/2006/main" xmlns:r="http://schemas.openxmlformats.org/officeDocument/2006/relationships" xmlns:p="http://schemas.openxmlformats.org/presentationml/2006/main">
-  <p:cSld>
-    <p:spTree>
-      <p:nvGrpSpPr>
-        <p:cNvPr id="1" name=""/>
-        <p:cNvGrpSpPr/>
-        <p:nvPr/>
-      </p:nvGrpSpPr>
-      <p:grpSpPr>
-        <a:xfrm>
-          <a:off x="0" y="0"/>
-          <a:ext cx="0" cy="0"/>
-          <a:chOff x="0" y="0"/>
-          <a:chExt cx="0" cy="0"/>
-        </a:xfrm>
-      </p:grpSpPr>
-      <p:sp>
-        <p:nvSpPr>
-          <p:cNvPr id="2" name="Title 1"/>
-          <p:cNvSpPr>
-            <a:spLocks noGrp="1"/>
-          </p:cNvSpPr>
-          <p:nvPr>
-            <p:ph type="ctrTitle"/>
-          </p:nvPr>
-        </p:nvSpPr>
-        <p:spPr/>
-        <p:txBody>
-          <a:bodyPr/>
-          <a:lstStyle/>
-          <a:p>
-            <a:r>
-              <a:rPr lang="en-US" dirty="0" smtClean="0"/>
               <a:t>Thank you!!!!</a:t>
             </a:r>
             <a:endParaRPr lang="en-US" dirty="0"/>
@@ -4695,6 +4589,13 @@
   <p:clrMapOvr>
     <a:masterClrMapping/>
   </p:clrMapOvr>
+  <p:timing>
+    <p:tnLst>
+      <p:par>
+        <p:cTn id="1" dur="indefinite" restart="never" nodeType="tmRoot"/>
+      </p:par>
+    </p:tnLst>
+  </p:timing>
 </p:sld>
 </file>
 
@@ -4793,11 +4694,6 @@
               </a:rPr>
               <a:t>Directives.</a:t>
             </a:r>
-            <a:endParaRPr lang="en-US" sz="2400" dirty="0">
-              <a:solidFill>
-                <a:schemeClr val="tx1"/>
-              </a:solidFill>
-            </a:endParaRPr>
           </a:p>
           <a:p>
             <a:r>
@@ -4826,39 +4722,18 @@
                   <a:schemeClr val="tx1"/>
                 </a:solidFill>
               </a:rPr>
-              <a:t>Factory</a:t>
-            </a:r>
+              <a:t>Factory.</a:t>
+            </a:r>
+          </a:p>
+          <a:p>
             <a:r>
               <a:rPr lang="en-US" sz="2400" dirty="0">
                 <a:solidFill>
                   <a:schemeClr val="tx1"/>
                 </a:solidFill>
               </a:rPr>
-              <a:t>.</a:t>
-            </a:r>
-          </a:p>
-          <a:p>
-            <a:r>
-              <a:rPr lang="en-US" sz="2400" dirty="0">
-                <a:solidFill>
-                  <a:schemeClr val="tx1"/>
-                </a:solidFill>
-              </a:rPr>
-              <a:t>Custom Directives</a:t>
-            </a:r>
-            <a:r>
-              <a:rPr lang="en-US" sz="2400" dirty="0">
-                <a:solidFill>
-                  <a:schemeClr val="tx1"/>
-                </a:solidFill>
-              </a:rPr>
-              <a:t>.</a:t>
-            </a:r>
-            <a:endParaRPr lang="en-US" sz="2400" dirty="0">
-              <a:solidFill>
-                <a:schemeClr val="tx1"/>
-              </a:solidFill>
-            </a:endParaRPr>
+              <a:t>Custom Directives.</a:t>
+            </a:r>
           </a:p>
         </p:txBody>
       </p:sp>
@@ -4978,11 +4853,6 @@
               </a:rPr>
               <a:t>Mainly used to build single page applications </a:t>
             </a:r>
-            <a:endParaRPr lang="en-US" sz="2400" dirty="0">
-              <a:solidFill>
-                <a:schemeClr val="tx1"/>
-              </a:solidFill>
-            </a:endParaRPr>
           </a:p>
           <a:p>
             <a:r>
@@ -4991,31 +4861,7 @@
                   <a:schemeClr val="tx1"/>
                 </a:solidFill>
               </a:rPr>
-              <a:t>Angular brings traditionally </a:t>
-            </a:r>
-            <a:r>
-              <a:rPr lang="en-US" sz="2400" dirty="0">
-                <a:solidFill>
-                  <a:schemeClr val="tx1"/>
-                </a:solidFill>
-              </a:rPr>
-              <a:t>server-side</a:t>
-            </a:r>
-            <a:r>
-              <a:rPr lang="en-US" sz="2400" dirty="0">
-                <a:solidFill>
-                  <a:schemeClr val="tx1"/>
-                </a:solidFill>
-              </a:rPr>
-              <a:t> services, such as view-dependent controllers, to client-side web applications. Consequently, much of the burden on the server can be </a:t>
-            </a:r>
-            <a:r>
-              <a:rPr lang="en-US" sz="2400" dirty="0">
-                <a:solidFill>
-                  <a:schemeClr val="tx1"/>
-                </a:solidFill>
-              </a:rPr>
-              <a:t>reduced.</a:t>
+              <a:t>Angular brings traditionally server-side services, such as view-dependent controllers, to client-side web applications. Consequently, much of the burden on the server can be reduced.</a:t>
             </a:r>
           </a:p>
           <a:p>
@@ -5848,7 +5694,7 @@
         <p:spPr/>
         <p:txBody>
           <a:bodyPr>
-            <a:normAutofit/>
+            <a:normAutofit fontScale="92500" lnSpcReduction="10000"/>
           </a:bodyPr>
           <a:lstStyle/>
           <a:p>
@@ -5856,12 +5702,12 @@
           </a:p>
           <a:p>
             <a:r>
-              <a:rPr lang="en-US" sz="2400" dirty="0" smtClean="0"/>
-              <a:t>Download </a:t>
-            </a:r>
-            <a:r>
-              <a:rPr lang="en-US" sz="2400" dirty="0" smtClean="0"/>
-              <a:t>AngularJS  from </a:t>
+              <a:rPr lang="en-US" sz="2400" dirty="0">
+                <a:solidFill>
+                  <a:schemeClr val="tx1"/>
+                </a:solidFill>
+              </a:rPr>
+              <a:t>Download AngularJS  from </a:t>
             </a:r>
             <a:r>
               <a:rPr lang="en-US" sz="2400" b="1" dirty="0">
@@ -5951,44 +5797,24 @@
           </a:p>
           <a:p>
             <a:r>
+              <a:rPr lang="en-US" sz="2400" dirty="0" smtClean="0">
+                <a:solidFill>
+                  <a:schemeClr val="tx1"/>
+                </a:solidFill>
+              </a:rPr>
+              <a:t>Clone Repository </a:t>
+            </a:r>
+            <a:r>
               <a:rPr lang="en-US" sz="2400" dirty="0">
-                <a:solidFill>
-                  <a:schemeClr val="tx1"/>
-                </a:solidFill>
-              </a:rPr>
-              <a:t>Setup </a:t>
-            </a:r>
-            <a:r>
-              <a:rPr lang="en-US" sz="2400" dirty="0">
-                <a:solidFill>
-                  <a:schemeClr val="tx1"/>
-                </a:solidFill>
-              </a:rPr>
-              <a:t>IntelliSense</a:t>
-            </a:r>
-            <a:r>
-              <a:rPr lang="en-US" sz="2400" dirty="0">
-                <a:solidFill>
-                  <a:schemeClr val="tx1"/>
-                </a:solidFill>
-              </a:rPr>
-              <a:t> on </a:t>
+                <a:hlinkClick r:id="rId4"/>
+              </a:rPr>
+              <a:t>https://</a:t>
             </a:r>
             <a:r>
               <a:rPr lang="en-US" sz="2400" dirty="0" smtClean="0">
-                <a:solidFill>
-                  <a:schemeClr val="tx1"/>
-                </a:solidFill>
-              </a:rPr>
-              <a:t>VS code </a:t>
-            </a:r>
-            <a:r>
-              <a:rPr lang="en-US" sz="2400" dirty="0">
-                <a:solidFill>
-                  <a:schemeClr val="tx1"/>
-                </a:solidFill>
-              </a:rPr>
-              <a:t>using </a:t>
+                <a:hlinkClick r:id="rId4"/>
+              </a:rPr>
+              <a:t>github.com/GunashekarKoppula/angular_sample_app</a:t>
             </a:r>
             <a:endParaRPr lang="en-US" sz="2400" dirty="0" smtClean="0">
               <a:solidFill>
@@ -5997,6 +5823,37 @@
             </a:endParaRPr>
           </a:p>
           <a:p>
+            <a:r>
+              <a:rPr lang="en-US" sz="2400" dirty="0">
+                <a:solidFill>
+                  <a:schemeClr val="tx1"/>
+                </a:solidFill>
+              </a:rPr>
+              <a:t>Setup IntelliSense on </a:t>
+            </a:r>
+            <a:r>
+              <a:rPr lang="en-US" sz="2400" dirty="0" smtClean="0">
+                <a:solidFill>
+                  <a:schemeClr val="tx1"/>
+                </a:solidFill>
+              </a:rPr>
+              <a:t>VS code </a:t>
+            </a:r>
+            <a:r>
+              <a:rPr lang="en-US" sz="2400" dirty="0">
+                <a:solidFill>
+                  <a:schemeClr val="tx1"/>
+                </a:solidFill>
+              </a:rPr>
+              <a:t>using </a:t>
+            </a:r>
+            <a:endParaRPr lang="en-US" sz="2400" dirty="0" smtClean="0">
+              <a:solidFill>
+                <a:schemeClr val="tx1"/>
+              </a:solidFill>
+            </a:endParaRPr>
+          </a:p>
+          <a:p>
             <a:pPr marL="0" indent="0">
               <a:buNone/>
             </a:pPr>
@@ -6006,7 +5863,33 @@
                   <a:schemeClr val="tx1"/>
                 </a:solidFill>
               </a:rPr>
-              <a:t> </a:t>
+              <a:t>    </a:t>
+            </a:r>
+            <a:r>
+              <a:rPr lang="nb-NO" sz="2400" dirty="0">
+                <a:solidFill>
+                  <a:schemeClr val="tx1"/>
+                </a:solidFill>
+              </a:rPr>
+              <a:t>npm install -g --save-dev @</a:t>
+            </a:r>
+            <a:r>
+              <a:rPr lang="nb-NO" sz="2400" dirty="0" smtClean="0">
+                <a:solidFill>
+                  <a:schemeClr val="tx1"/>
+                </a:solidFill>
+              </a:rPr>
+              <a:t>types/angular</a:t>
+            </a:r>
+          </a:p>
+          <a:p>
+            <a:r>
+              <a:rPr lang="en-US" sz="2400" dirty="0" err="1">
+                <a:solidFill>
+                  <a:schemeClr val="tx1"/>
+                </a:solidFill>
+              </a:rPr>
+              <a:t>Npm</a:t>
             </a:r>
             <a:r>
               <a:rPr lang="en-US" sz="2400" dirty="0">
@@ -6014,23 +5897,47 @@
                   <a:schemeClr val="tx1"/>
                 </a:solidFill>
               </a:rPr>
-              <a:t>   </a:t>
-            </a:r>
-            <a:r>
-              <a:rPr lang="nb-NO" sz="2400" dirty="0">
-                <a:solidFill>
-                  <a:schemeClr val="tx1"/>
-                </a:solidFill>
-              </a:rPr>
-              <a:t>npm </a:t>
-            </a:r>
-            <a:r>
-              <a:rPr lang="nb-NO" sz="2400" dirty="0">
-                <a:solidFill>
-                  <a:schemeClr val="tx1"/>
-                </a:solidFill>
-              </a:rPr>
-              <a:t>install -g --save-dev @types/angular</a:t>
+              <a:t> install –g static-server </a:t>
+            </a:r>
+            <a:r>
+              <a:rPr lang="en-US" sz="2400" dirty="0" smtClean="0">
+                <a:solidFill>
+                  <a:schemeClr val="tx1"/>
+                </a:solidFill>
+              </a:rPr>
+              <a:t> &amp; Static </a:t>
+            </a:r>
+            <a:r>
+              <a:rPr lang="en-US" sz="2400" dirty="0">
+                <a:solidFill>
+                  <a:schemeClr val="tx1"/>
+                </a:solidFill>
+              </a:rPr>
+              <a:t>–p </a:t>
+            </a:r>
+            <a:r>
+              <a:rPr lang="en-US" sz="2400" dirty="0" smtClean="0">
+                <a:solidFill>
+                  <a:schemeClr val="tx1"/>
+                </a:solidFill>
+              </a:rPr>
+              <a:t>“</a:t>
+            </a:r>
+            <a:r>
+              <a:rPr lang="en-US" sz="2400" dirty="0" err="1" smtClean="0">
+                <a:solidFill>
+                  <a:schemeClr val="tx1"/>
+                </a:solidFill>
+              </a:rPr>
+              <a:t>portnumber</a:t>
+            </a:r>
+            <a:r>
+              <a:rPr lang="en-US" sz="2400" dirty="0" smtClean="0">
+                <a:solidFill>
+                  <a:schemeClr val="tx1"/>
+                </a:solidFill>
+              </a:rPr>
+              <a:t>”</a:t>
             </a:r>
             <a:endParaRPr lang="en-US" sz="2400" dirty="0">
               <a:solidFill>
@@ -6045,21 +5952,8 @@
                   <a:schemeClr val="tx1"/>
                 </a:solidFill>
               </a:rPr>
-              <a:t>Include ng-app attribute </a:t>
-            </a:r>
-            <a:r>
-              <a:rPr lang="en-US" sz="2400" dirty="0">
-                <a:solidFill>
-                  <a:schemeClr val="tx1"/>
-                </a:solidFill>
-              </a:rPr>
-              <a:t>in html code.</a:t>
-            </a:r>
-            <a:endParaRPr lang="en-US" sz="2400" dirty="0">
-              <a:solidFill>
-                <a:schemeClr val="tx1"/>
-              </a:solidFill>
-            </a:endParaRPr>
+              <a:t>Include ng-app attribute in html code.</a:t>
+            </a:r>
           </a:p>
         </p:txBody>
       </p:sp>
@@ -6189,33 +6083,36 @@
                   <a:schemeClr val="tx1"/>
                 </a:solidFill>
               </a:rPr>
-              <a:t>ng-model directive binds the value of HTML controls (input, select, </a:t>
-            </a:r>
+              <a:t>ng-model directive binds the value of HTML controls (input, select, text area) to application data.</a:t>
+            </a:r>
+          </a:p>
+          <a:p>
             <a:r>
               <a:rPr lang="en-US" sz="2400" dirty="0">
                 <a:solidFill>
                   <a:schemeClr val="tx1"/>
                 </a:solidFill>
               </a:rPr>
-              <a:t>text area) </a:t>
-            </a:r>
+              <a:t>ng-controller directive attaches a controller class to the view.</a:t>
+            </a:r>
+          </a:p>
+          <a:p>
             <a:r>
               <a:rPr lang="en-US" sz="2400" dirty="0">
                 <a:solidFill>
                   <a:schemeClr val="tx1"/>
                 </a:solidFill>
               </a:rPr>
-              <a:t>to application data.</a:t>
-            </a:r>
-          </a:p>
-          <a:p>
+              <a:t>Learn more at </a:t>
+            </a:r>
             <a:r>
               <a:rPr lang="en-US" sz="2400" dirty="0">
                 <a:solidFill>
-                  <a:schemeClr val="tx1"/>
-                </a:solidFill>
-              </a:rPr>
-              <a:t>ng-controller directive attaches a controller class to the view</a:t>
+                  <a:srgbClr val="92D050"/>
+                </a:solidFill>
+                <a:hlinkClick r:id="rId2"/>
+              </a:rPr>
+              <a:t>https://code.angularjs.org/1.7.8/docs/api/ng/directive</a:t>
             </a:r>
             <a:r>
               <a:rPr lang="en-US" sz="2400" dirty="0">
@@ -6225,47 +6122,6 @@
               </a:rPr>
               <a:t>.</a:t>
             </a:r>
-          </a:p>
-          <a:p>
-            <a:r>
-              <a:rPr lang="en-US" sz="2400" dirty="0">
-                <a:solidFill>
-                  <a:schemeClr val="tx1"/>
-                </a:solidFill>
-              </a:rPr>
-              <a:t>Learn more at </a:t>
-            </a:r>
-            <a:r>
-              <a:rPr lang="en-US" sz="2400" dirty="0">
-                <a:solidFill>
-                  <a:srgbClr val="92D050"/>
-                </a:solidFill>
-                <a:hlinkClick r:id="rId2"/>
-              </a:rPr>
-              <a:t>https://</a:t>
-            </a:r>
-            <a:r>
-              <a:rPr lang="en-US" sz="2400" dirty="0">
-                <a:solidFill>
-                  <a:srgbClr val="92D050"/>
-                </a:solidFill>
-                <a:hlinkClick r:id="rId2"/>
-              </a:rPr>
-              <a:t>code.angularjs.org/1.7.8/docs/api/ng/directive</a:t>
-            </a:r>
-            <a:r>
-              <a:rPr lang="en-US" sz="2400" dirty="0">
-                <a:solidFill>
-                  <a:schemeClr val="tx1"/>
-                </a:solidFill>
-              </a:rPr>
-              <a:t>.</a:t>
-            </a:r>
-            <a:endParaRPr lang="en-US" sz="2400" dirty="0">
-              <a:solidFill>
-                <a:schemeClr val="tx1"/>
-              </a:solidFill>
-            </a:endParaRPr>
           </a:p>
         </p:txBody>
       </p:sp>
@@ -6486,15 +6342,20 @@
                   <a:schemeClr val="tx1"/>
                 </a:solidFill>
               </a:rPr>
-              <a:t> </a:t>
-            </a:r>
+              <a:t>     use the angular objects module method to create a           </a:t>
+            </a:r>
+          </a:p>
+          <a:p>
+            <a:pPr marL="0" indent="0">
+              <a:buNone/>
+            </a:pPr>
             <a:r>
               <a:rPr lang="en-US" sz="2400" dirty="0">
                 <a:solidFill>
                   <a:schemeClr val="tx1"/>
                 </a:solidFill>
               </a:rPr>
-              <a:t>    use the angular objects module method to create a           </a:t>
+              <a:t>     module.</a:t>
             </a:r>
           </a:p>
           <a:p>
@@ -6507,7 +6368,15 @@
                   <a:schemeClr val="tx1"/>
                 </a:solidFill>
               </a:rPr>
-              <a:t> </a:t>
+              <a:t>     </a:t>
+            </a:r>
+            <a:r>
+              <a:rPr lang="en-US" sz="2400" dirty="0" err="1">
+                <a:solidFill>
+                  <a:schemeClr val="tx1"/>
+                </a:solidFill>
+              </a:rPr>
+              <a:t>var</a:t>
             </a:r>
             <a:r>
               <a:rPr lang="en-US" sz="2400" dirty="0">
@@ -6515,20 +6384,31 @@
                   <a:schemeClr val="tx1"/>
                 </a:solidFill>
               </a:rPr>
-              <a:t>    module.</a:t>
-            </a:r>
-          </a:p>
-          <a:p>
-            <a:pPr marL="0" indent="0">
-              <a:buNone/>
-            </a:pPr>
+              <a:t> app = </a:t>
+            </a:r>
+            <a:r>
+              <a:rPr lang="en-US" sz="2400" dirty="0" err="1">
+                <a:solidFill>
+                  <a:schemeClr val="tx1"/>
+                </a:solidFill>
+              </a:rPr>
+              <a:t>angular.module</a:t>
+            </a:r>
             <a:r>
               <a:rPr lang="en-US" sz="2400" dirty="0">
                 <a:solidFill>
                   <a:schemeClr val="tx1"/>
                 </a:solidFill>
               </a:rPr>
-              <a:t> </a:t>
+              <a:t>("</a:t>
+            </a:r>
+            <a:r>
+              <a:rPr lang="en-US" sz="2400" dirty="0" err="1">
+                <a:solidFill>
+                  <a:schemeClr val="tx1"/>
+                </a:solidFill>
+              </a:rPr>
+              <a:t>myApp</a:t>
             </a:r>
             <a:r>
               <a:rPr lang="en-US" sz="2400" dirty="0">
@@ -6536,71 +6416,7 @@
                   <a:schemeClr val="tx1"/>
                 </a:solidFill>
               </a:rPr>
-              <a:t>    </a:t>
-            </a:r>
-            <a:r>
-              <a:rPr lang="en-US" sz="2400" dirty="0" err="1">
-                <a:solidFill>
-                  <a:schemeClr val="tx1"/>
-                </a:solidFill>
-              </a:rPr>
-              <a:t>var</a:t>
-            </a:r>
-            <a:r>
-              <a:rPr lang="en-US" sz="2400" dirty="0">
-                <a:solidFill>
-                  <a:schemeClr val="tx1"/>
-                </a:solidFill>
-              </a:rPr>
-              <a:t> </a:t>
-            </a:r>
-            <a:r>
-              <a:rPr lang="en-US" sz="2400" dirty="0">
-                <a:solidFill>
-                  <a:schemeClr val="tx1"/>
-                </a:solidFill>
-              </a:rPr>
-              <a:t>app = </a:t>
-            </a:r>
-            <a:r>
-              <a:rPr lang="en-US" sz="2400" dirty="0" err="1">
-                <a:solidFill>
-                  <a:schemeClr val="tx1"/>
-                </a:solidFill>
-              </a:rPr>
-              <a:t>angular.module</a:t>
-            </a:r>
-            <a:r>
-              <a:rPr lang="en-US" sz="2400" dirty="0">
-                <a:solidFill>
-                  <a:schemeClr val="tx1"/>
-                </a:solidFill>
-              </a:rPr>
-              <a:t>("</a:t>
-            </a:r>
-            <a:r>
-              <a:rPr lang="en-US" sz="2400" dirty="0" err="1">
-                <a:solidFill>
-                  <a:schemeClr val="tx1"/>
-                </a:solidFill>
-              </a:rPr>
-              <a:t>myApp</a:t>
-            </a:r>
-            <a:r>
-              <a:rPr lang="en-US" sz="2400" dirty="0">
-                <a:solidFill>
-                  <a:schemeClr val="tx1"/>
-                </a:solidFill>
-              </a:rPr>
-              <a:t>", </a:t>
-            </a:r>
-            <a:r>
-              <a:rPr lang="en-US" sz="2400" dirty="0">
-                <a:solidFill>
-                  <a:schemeClr val="tx1"/>
-                </a:solidFill>
-              </a:rPr>
-              <a:t>[]); </a:t>
+              <a:t>", []); </a:t>
             </a:r>
           </a:p>
           <a:p>
@@ -6866,68 +6682,52 @@
                   <a:schemeClr val="tx1"/>
                 </a:solidFill>
               </a:rPr>
+              <a:t>     </a:t>
+            </a:r>
+            <a:r>
+              <a:rPr lang="en-US" sz="2400" dirty="0" err="1">
+                <a:solidFill>
+                  <a:schemeClr val="tx1"/>
+                </a:solidFill>
+              </a:rPr>
+              <a:t>var</a:t>
+            </a:r>
+            <a:r>
+              <a:rPr lang="en-US" sz="2400" dirty="0">
+                <a:solidFill>
+                  <a:schemeClr val="tx1"/>
+                </a:solidFill>
+              </a:rPr>
               <a:t> </a:t>
             </a:r>
             <a:r>
+              <a:rPr lang="en-US" sz="2400" dirty="0" err="1">
+                <a:solidFill>
+                  <a:schemeClr val="tx1"/>
+                </a:solidFill>
+              </a:rPr>
+              <a:t>myController</a:t>
+            </a:r>
+            <a:r>
               <a:rPr lang="en-US" sz="2400" dirty="0">
                 <a:solidFill>
                   <a:schemeClr val="tx1"/>
                 </a:solidFill>
               </a:rPr>
-              <a:t>    </a:t>
-            </a:r>
-            <a:r>
-              <a:rPr lang="en-US" sz="2400" dirty="0" err="1">
-                <a:solidFill>
-                  <a:schemeClr val="tx1"/>
-                </a:solidFill>
-              </a:rPr>
-              <a:t>var</a:t>
-            </a:r>
+              <a:t>= function($scope){</a:t>
+            </a:r>
+          </a:p>
+          <a:p>
+            <a:pPr marL="0" indent="0">
+              <a:buNone/>
+            </a:pPr>
             <a:r>
               <a:rPr lang="en-US" sz="2400" dirty="0">
                 <a:solidFill>
                   <a:schemeClr val="tx1"/>
                 </a:solidFill>
               </a:rPr>
-              <a:t> </a:t>
-            </a:r>
-            <a:r>
-              <a:rPr lang="en-US" sz="2400" dirty="0" err="1">
-                <a:solidFill>
-                  <a:schemeClr val="tx1"/>
-                </a:solidFill>
-              </a:rPr>
-              <a:t>myController</a:t>
-            </a:r>
-            <a:r>
-              <a:rPr lang="en-US" sz="2400" dirty="0">
-                <a:solidFill>
-                  <a:schemeClr val="tx1"/>
-                </a:solidFill>
-              </a:rPr>
-              <a:t>= function($scope){</a:t>
-            </a:r>
-          </a:p>
-          <a:p>
-            <a:pPr marL="0" indent="0">
-              <a:buNone/>
-            </a:pPr>
-            <a:r>
-              <a:rPr lang="en-US" sz="2400" dirty="0">
-                <a:solidFill>
-                  <a:schemeClr val="tx1"/>
-                </a:solidFill>
-              </a:rPr>
-              <a:t> </a:t>
-            </a:r>
-            <a:r>
-              <a:rPr lang="en-US" sz="2400" dirty="0">
-                <a:solidFill>
-                  <a:schemeClr val="tx1"/>
-                </a:solidFill>
-              </a:rPr>
-              <a:t>     $</a:t>
+              <a:t>      $</a:t>
             </a:r>
             <a:r>
               <a:rPr lang="en-US" sz="2400" dirty="0" err="1" smtClean="0">
@@ -6977,21 +6777,8 @@
                   <a:schemeClr val="tx1"/>
                 </a:solidFill>
               </a:rPr>
-              <a:t> </a:t>
-            </a:r>
-            <a:r>
-              <a:rPr lang="en-US" sz="2400" dirty="0">
-                <a:solidFill>
-                  <a:schemeClr val="tx1"/>
-                </a:solidFill>
-              </a:rPr>
-              <a:t>     }</a:t>
-            </a:r>
-            <a:endParaRPr lang="en-US" sz="2400" dirty="0">
-              <a:solidFill>
-                <a:schemeClr val="tx1"/>
-              </a:solidFill>
-            </a:endParaRPr>
+              <a:t>      }</a:t>
+            </a:r>
           </a:p>
         </p:txBody>
       </p:sp>

</xml_diff>